<commit_message>
Images von Student geändert
</commit_message>
<xml_diff>
--- a/Präsentation Plan.pptx
+++ b/Präsentation Plan.pptx
@@ -120,6 +120,9 @@
         </p14:section>
       </p14:sectionLst>
     </p:ext>
+    <p:ext uri="{EFAFB233-063F-42B5-8137-9DF3F51BA10A}">
+      <p15:sldGuideLst xmlns:p15="http://schemas.microsoft.com/office/powerpoint/2012/main"/>
+    </p:ext>
   </p:extLst>
 </p:presentation>
 </file>
@@ -169,7 +172,6 @@
               <a:rPr lang="de-DE"/>
               <a:t>Titelmasterformat durch Klicken bearbeiten</a:t>
             </a:r>
-            <a:endParaRPr lang="de-DE"/>
           </a:p>
         </p:txBody>
       </p:sp>
@@ -234,7 +236,6 @@
               <a:rPr lang="de-DE"/>
               <a:t>Formatvorlage des Untertitelmasters durch Klicken bearbeiten</a:t>
             </a:r>
-            <a:endParaRPr lang="de-DE"/>
           </a:p>
         </p:txBody>
       </p:sp>
@@ -352,7 +353,6 @@
               <a:rPr lang="de-DE"/>
               <a:t>Titelmasterformat durch Klicken bearbeiten</a:t>
             </a:r>
-            <a:endParaRPr lang="de-DE"/>
           </a:p>
         </p:txBody>
       </p:sp>
@@ -404,7 +404,6 @@
               <a:rPr lang="de-DE"/>
               <a:t>Fünfte Ebene</a:t>
             </a:r>
-            <a:endParaRPr lang="de-DE"/>
           </a:p>
         </p:txBody>
       </p:sp>
@@ -527,7 +526,6 @@
               <a:rPr lang="de-DE"/>
               <a:t>Titelmasterformat durch Klicken bearbeiten</a:t>
             </a:r>
-            <a:endParaRPr lang="de-DE"/>
           </a:p>
         </p:txBody>
       </p:sp>
@@ -584,7 +582,6 @@
               <a:rPr lang="de-DE"/>
               <a:t>Fünfte Ebene</a:t>
             </a:r>
-            <a:endParaRPr lang="de-DE"/>
           </a:p>
         </p:txBody>
       </p:sp>
@@ -702,7 +699,6 @@
               <a:rPr lang="de-DE"/>
               <a:t>Titelmasterformat durch Klicken bearbeiten</a:t>
             </a:r>
-            <a:endParaRPr lang="de-DE"/>
           </a:p>
         </p:txBody>
       </p:sp>
@@ -754,7 +750,6 @@
               <a:rPr lang="de-DE"/>
               <a:t>Fünfte Ebene</a:t>
             </a:r>
-            <a:endParaRPr lang="de-DE"/>
           </a:p>
         </p:txBody>
       </p:sp>
@@ -881,7 +876,6 @@
               <a:rPr lang="de-DE"/>
               <a:t>Titelmasterformat durch Klicken bearbeiten</a:t>
             </a:r>
-            <a:endParaRPr lang="de-DE"/>
           </a:p>
         </p:txBody>
       </p:sp>
@@ -1118,7 +1112,6 @@
               <a:rPr lang="de-DE"/>
               <a:t>Titelmasterformat durch Klicken bearbeiten</a:t>
             </a:r>
-            <a:endParaRPr lang="de-DE"/>
           </a:p>
         </p:txBody>
       </p:sp>
@@ -1175,7 +1168,6 @@
               <a:rPr lang="de-DE"/>
               <a:t>Fünfte Ebene</a:t>
             </a:r>
-            <a:endParaRPr lang="de-DE"/>
           </a:p>
         </p:txBody>
       </p:sp>
@@ -1232,7 +1224,6 @@
               <a:rPr lang="de-DE"/>
               <a:t>Fünfte Ebene</a:t>
             </a:r>
-            <a:endParaRPr lang="de-DE"/>
           </a:p>
         </p:txBody>
       </p:sp>
@@ -1355,7 +1346,6 @@
               <a:rPr lang="de-DE"/>
               <a:t>Titelmasterformat durch Klicken bearbeiten</a:t>
             </a:r>
-            <a:endParaRPr lang="de-DE"/>
           </a:p>
         </p:txBody>
       </p:sp>
@@ -1477,7 +1467,6 @@
               <a:rPr lang="de-DE"/>
               <a:t>Fünfte Ebene</a:t>
             </a:r>
-            <a:endParaRPr lang="de-DE"/>
           </a:p>
         </p:txBody>
       </p:sp>
@@ -1599,7 +1588,6 @@
               <a:rPr lang="de-DE"/>
               <a:t>Fünfte Ebene</a:t>
             </a:r>
-            <a:endParaRPr lang="de-DE"/>
           </a:p>
         </p:txBody>
       </p:sp>
@@ -1717,7 +1705,6 @@
               <a:rPr lang="de-DE"/>
               <a:t>Titelmasterformat durch Klicken bearbeiten</a:t>
             </a:r>
-            <a:endParaRPr lang="de-DE"/>
           </a:p>
         </p:txBody>
       </p:sp>
@@ -1939,7 +1926,6 @@
               <a:rPr lang="de-DE"/>
               <a:t>Titelmasterformat durch Klicken bearbeiten</a:t>
             </a:r>
-            <a:endParaRPr lang="de-DE"/>
           </a:p>
         </p:txBody>
       </p:sp>
@@ -2024,7 +2010,6 @@
               <a:rPr lang="de-DE"/>
               <a:t>Fünfte Ebene</a:t>
             </a:r>
-            <a:endParaRPr lang="de-DE"/>
           </a:p>
         </p:txBody>
       </p:sp>
@@ -2216,7 +2201,6 @@
               <a:rPr lang="de-DE"/>
               <a:t>Titelmasterformat durch Klicken bearbeiten</a:t>
             </a:r>
-            <a:endParaRPr lang="de-DE"/>
           </a:p>
         </p:txBody>
       </p:sp>
@@ -2475,7 +2459,6 @@
               <a:rPr lang="de-DE"/>
               <a:t>Titelmasterformat durch Klicken bearbeiten</a:t>
             </a:r>
-            <a:endParaRPr lang="de-DE"/>
           </a:p>
         </p:txBody>
       </p:sp>
@@ -2537,7 +2520,6 @@
               <a:rPr lang="de-DE"/>
               <a:t>Fünfte Ebene</a:t>
             </a:r>
-            <a:endParaRPr lang="de-DE"/>
           </a:p>
         </p:txBody>
       </p:sp>
@@ -7508,7 +7490,7 @@
           <p:nvPr>
             <p:extLst>
               <p:ext uri="{D42A27DB-BD31-4B8C-83A1-F6EECF244321}">
-                <p14:modId xmlns:p14="http://schemas.microsoft.com/office/powerpoint/2010/main" val="33446299"/>
+                <p14:modId xmlns:p14="http://schemas.microsoft.com/office/powerpoint/2010/main" val="3605272052"/>
               </p:ext>
             </p:extLst>
           </p:nvPr>
@@ -7752,8 +7734,13 @@
                     <a:p>
                       <a:r>
                         <a:rPr lang="de-DE" dirty="0"/>
-                        <a:t>4</a:t>
+                        <a:t>8</a:t>
                       </a:r>
+                      <a:r>
+                        <a:rPr lang="de-DE" baseline="0" dirty="0"/>
+                        <a:t> ¾ </a:t>
+                      </a:r>
+                      <a:endParaRPr lang="de-DE" dirty="0"/>
                     </a:p>
                   </a:txBody>
                   <a:tcPr/>
@@ -7769,7 +7756,7 @@
                       </a:r>
                       <a:r>
                         <a:rPr lang="de-DE" baseline="0" dirty="0"/>
-                        <a:t> ¾ </a:t>
+                        <a:t>  </a:t>
                       </a:r>
                       <a:endParaRPr lang="de-DE" dirty="0"/>
                     </a:p>
@@ -7901,7 +7888,7 @@
                     <a:p>
                       <a:r>
                         <a:rPr lang="de-DE" dirty="0"/>
-                        <a:t>2</a:t>
+                        <a:t>10</a:t>
                       </a:r>
                     </a:p>
                   </a:txBody>
@@ -7914,7 +7901,7 @@
                     <a:p>
                       <a:r>
                         <a:rPr lang="de-DE" dirty="0"/>
-                        <a:t>17</a:t>
+                        <a:t>14</a:t>
                       </a:r>
                     </a:p>
                   </a:txBody>
@@ -7973,7 +7960,7 @@
                     <a:p>
                       <a:r>
                         <a:rPr lang="de-DE" dirty="0"/>
-                        <a:t>1</a:t>
+                        <a:t>4</a:t>
                       </a:r>
                     </a:p>
                   </a:txBody>
@@ -7986,7 +7973,7 @@
                     <a:p>
                       <a:r>
                         <a:rPr lang="de-DE" dirty="0"/>
-                        <a:t>8</a:t>
+                        <a:t>5</a:t>
                       </a:r>
                     </a:p>
                   </a:txBody>
@@ -8045,7 +8032,7 @@
                     <a:p>
                       <a:r>
                         <a:rPr lang="de-DE" dirty="0"/>
-                        <a:t>3</a:t>
+                        <a:t>4</a:t>
                       </a:r>
                     </a:p>
                   </a:txBody>
@@ -8058,7 +8045,7 @@
                     <a:p>
                       <a:r>
                         <a:rPr lang="de-DE" dirty="0"/>
-                        <a:t>5</a:t>
+                        <a:t>4</a:t>
                       </a:r>
                     </a:p>
                   </a:txBody>
@@ -8549,7 +8536,7 @@
                     <a:p>
                       <a:r>
                         <a:rPr lang="de-DE" dirty="0"/>
-                        <a:t>0</a:t>
+                        <a:t>1</a:t>
                       </a:r>
                     </a:p>
                   </a:txBody>
@@ -8562,7 +8549,7 @@
                     <a:p>
                       <a:r>
                         <a:rPr lang="de-DE" dirty="0"/>
-                        <a:t>3</a:t>
+                        <a:t>2</a:t>
                       </a:r>
                     </a:p>
                   </a:txBody>
@@ -8615,7 +8602,7 @@
                     <a:p>
                       <a:r>
                         <a:rPr lang="de-DE" dirty="0"/>
-                        <a:t>24 ¼ </a:t>
+                        <a:t>40 </a:t>
                       </a:r>
                     </a:p>
                   </a:txBody>
@@ -8627,9 +8614,10 @@
                     <a:lstStyle/>
                     <a:p>
                       <a:r>
-                        <a:rPr lang="de-DE" dirty="0"/>
-                        <a:t>39 ¾ </a:t>
+                        <a:rPr lang="de-DE"/>
+                        <a:t>31</a:t>
                       </a:r>
+                      <a:endParaRPr lang="de-DE" dirty="0"/>
                     </a:p>
                   </a:txBody>
                   <a:tcPr/>

</xml_diff>